<commit_message>
Documentação PPTX & PDF (Atualizada)
</commit_message>
<xml_diff>
--- a/Diagrama de Solução(Sprint 2)PPTX Corrigido.pptx
+++ b/Diagrama de Solução(Sprint 2)PPTX Corrigido.pptx
@@ -106,7 +106,7 @@
   </p:defaultTextStyle>
   <p:extLst>
     <p:ext uri="{EFAFB233-063F-42B5-8137-9DF3F51BA10A}">
-      <p15:sldGuideLst xmlns="" xmlns:p15="http://schemas.microsoft.com/office/powerpoint/2012/main"/>
+      <p15:sldGuideLst xmlns:p15="http://schemas.microsoft.com/office/powerpoint/2012/main" xmlns=""/>
     </p:ext>
   </p:extLst>
 </p:presentation>
@@ -244,7 +244,7 @@
             <a:fld id="{846CE7D5-CF57-46EF-B807-FDD0502418D4}" type="datetimeFigureOut">
               <a:rPr lang="en-US" smtClean="0"/>
               <a:pPr/>
-              <a:t>4/26/2022</a:t>
+              <a:t>4/27/2022</a:t>
             </a:fld>
             <a:endParaRPr lang="en-US"/>
           </a:p>
@@ -296,7 +296,7 @@
     </p:spTree>
     <p:extLst>
       <p:ext uri="{BB962C8B-B14F-4D97-AF65-F5344CB8AC3E}">
-        <p14:creationId xmlns="" xmlns:p14="http://schemas.microsoft.com/office/powerpoint/2010/main" val="2385387890"/>
+        <p14:creationId xmlns:p14="http://schemas.microsoft.com/office/powerpoint/2010/main" xmlns="" val="2385387890"/>
       </p:ext>
     </p:extLst>
   </p:cSld>
@@ -416,7 +416,7 @@
             <a:fld id="{846CE7D5-CF57-46EF-B807-FDD0502418D4}" type="datetimeFigureOut">
               <a:rPr lang="en-US" smtClean="0"/>
               <a:pPr/>
-              <a:t>4/26/2022</a:t>
+              <a:t>4/27/2022</a:t>
             </a:fld>
             <a:endParaRPr lang="en-US"/>
           </a:p>
@@ -468,7 +468,7 @@
     </p:spTree>
     <p:extLst>
       <p:ext uri="{BB962C8B-B14F-4D97-AF65-F5344CB8AC3E}">
-        <p14:creationId xmlns="" xmlns:p14="http://schemas.microsoft.com/office/powerpoint/2010/main" val="2202905451"/>
+        <p14:creationId xmlns:p14="http://schemas.microsoft.com/office/powerpoint/2010/main" xmlns="" val="2202905451"/>
       </p:ext>
     </p:extLst>
   </p:cSld>
@@ -598,7 +598,7 @@
             <a:fld id="{846CE7D5-CF57-46EF-B807-FDD0502418D4}" type="datetimeFigureOut">
               <a:rPr lang="en-US" smtClean="0"/>
               <a:pPr/>
-              <a:t>4/26/2022</a:t>
+              <a:t>4/27/2022</a:t>
             </a:fld>
             <a:endParaRPr lang="en-US"/>
           </a:p>
@@ -650,7 +650,7 @@
     </p:spTree>
     <p:extLst>
       <p:ext uri="{BB962C8B-B14F-4D97-AF65-F5344CB8AC3E}">
-        <p14:creationId xmlns="" xmlns:p14="http://schemas.microsoft.com/office/powerpoint/2010/main" val="3479445657"/>
+        <p14:creationId xmlns:p14="http://schemas.microsoft.com/office/powerpoint/2010/main" xmlns="" val="3479445657"/>
       </p:ext>
     </p:extLst>
   </p:cSld>
@@ -770,7 +770,7 @@
             <a:fld id="{846CE7D5-CF57-46EF-B807-FDD0502418D4}" type="datetimeFigureOut">
               <a:rPr lang="en-US" smtClean="0"/>
               <a:pPr/>
-              <a:t>4/26/2022</a:t>
+              <a:t>4/27/2022</a:t>
             </a:fld>
             <a:endParaRPr lang="en-US"/>
           </a:p>
@@ -822,7 +822,7 @@
     </p:spTree>
     <p:extLst>
       <p:ext uri="{BB962C8B-B14F-4D97-AF65-F5344CB8AC3E}">
-        <p14:creationId xmlns="" xmlns:p14="http://schemas.microsoft.com/office/powerpoint/2010/main" val="949138452"/>
+        <p14:creationId xmlns:p14="http://schemas.microsoft.com/office/powerpoint/2010/main" xmlns="" val="949138452"/>
       </p:ext>
     </p:extLst>
   </p:cSld>
@@ -1018,7 +1018,7 @@
             <a:fld id="{846CE7D5-CF57-46EF-B807-FDD0502418D4}" type="datetimeFigureOut">
               <a:rPr lang="en-US" smtClean="0"/>
               <a:pPr/>
-              <a:t>4/26/2022</a:t>
+              <a:t>4/27/2022</a:t>
             </a:fld>
             <a:endParaRPr lang="en-US"/>
           </a:p>
@@ -1070,7 +1070,7 @@
     </p:spTree>
     <p:extLst>
       <p:ext uri="{BB962C8B-B14F-4D97-AF65-F5344CB8AC3E}">
-        <p14:creationId xmlns="" xmlns:p14="http://schemas.microsoft.com/office/powerpoint/2010/main" val="2591524520"/>
+        <p14:creationId xmlns:p14="http://schemas.microsoft.com/office/powerpoint/2010/main" xmlns="" val="2591524520"/>
       </p:ext>
     </p:extLst>
   </p:cSld>
@@ -1252,7 +1252,7 @@
             <a:fld id="{846CE7D5-CF57-46EF-B807-FDD0502418D4}" type="datetimeFigureOut">
               <a:rPr lang="en-US" smtClean="0"/>
               <a:pPr/>
-              <a:t>4/26/2022</a:t>
+              <a:t>4/27/2022</a:t>
             </a:fld>
             <a:endParaRPr lang="en-US"/>
           </a:p>
@@ -1304,7 +1304,7 @@
     </p:spTree>
     <p:extLst>
       <p:ext uri="{BB962C8B-B14F-4D97-AF65-F5344CB8AC3E}">
-        <p14:creationId xmlns="" xmlns:p14="http://schemas.microsoft.com/office/powerpoint/2010/main" val="1203092039"/>
+        <p14:creationId xmlns:p14="http://schemas.microsoft.com/office/powerpoint/2010/main" xmlns="" val="1203092039"/>
       </p:ext>
     </p:extLst>
   </p:cSld>
@@ -1621,7 +1621,7 @@
             <a:fld id="{846CE7D5-CF57-46EF-B807-FDD0502418D4}" type="datetimeFigureOut">
               <a:rPr lang="en-US" smtClean="0"/>
               <a:pPr/>
-              <a:t>4/26/2022</a:t>
+              <a:t>4/27/2022</a:t>
             </a:fld>
             <a:endParaRPr lang="en-US"/>
           </a:p>
@@ -1673,7 +1673,7 @@
     </p:spTree>
     <p:extLst>
       <p:ext uri="{BB962C8B-B14F-4D97-AF65-F5344CB8AC3E}">
-        <p14:creationId xmlns="" xmlns:p14="http://schemas.microsoft.com/office/powerpoint/2010/main" val="3733172339"/>
+        <p14:creationId xmlns:p14="http://schemas.microsoft.com/office/powerpoint/2010/main" xmlns="" val="3733172339"/>
       </p:ext>
     </p:extLst>
   </p:cSld>
@@ -1741,7 +1741,7 @@
             <a:fld id="{846CE7D5-CF57-46EF-B807-FDD0502418D4}" type="datetimeFigureOut">
               <a:rPr lang="en-US" smtClean="0"/>
               <a:pPr/>
-              <a:t>4/26/2022</a:t>
+              <a:t>4/27/2022</a:t>
             </a:fld>
             <a:endParaRPr lang="en-US"/>
           </a:p>
@@ -1793,7 +1793,7 @@
     </p:spTree>
     <p:extLst>
       <p:ext uri="{BB962C8B-B14F-4D97-AF65-F5344CB8AC3E}">
-        <p14:creationId xmlns="" xmlns:p14="http://schemas.microsoft.com/office/powerpoint/2010/main" val="3210312558"/>
+        <p14:creationId xmlns:p14="http://schemas.microsoft.com/office/powerpoint/2010/main" xmlns="" val="3210312558"/>
       </p:ext>
     </p:extLst>
   </p:cSld>
@@ -1838,7 +1838,7 @@
             <a:fld id="{846CE7D5-CF57-46EF-B807-FDD0502418D4}" type="datetimeFigureOut">
               <a:rPr lang="en-US" smtClean="0"/>
               <a:pPr/>
-              <a:t>4/26/2022</a:t>
+              <a:t>4/27/2022</a:t>
             </a:fld>
             <a:endParaRPr lang="en-US"/>
           </a:p>
@@ -1890,7 +1890,7 @@
     </p:spTree>
     <p:extLst>
       <p:ext uri="{BB962C8B-B14F-4D97-AF65-F5344CB8AC3E}">
-        <p14:creationId xmlns="" xmlns:p14="http://schemas.microsoft.com/office/powerpoint/2010/main" val="3146388984"/>
+        <p14:creationId xmlns:p14="http://schemas.microsoft.com/office/powerpoint/2010/main" xmlns="" val="3146388984"/>
       </p:ext>
     </p:extLst>
   </p:cSld>
@@ -2117,7 +2117,7 @@
             <a:fld id="{846CE7D5-CF57-46EF-B807-FDD0502418D4}" type="datetimeFigureOut">
               <a:rPr lang="en-US" smtClean="0"/>
               <a:pPr/>
-              <a:t>4/26/2022</a:t>
+              <a:t>4/27/2022</a:t>
             </a:fld>
             <a:endParaRPr lang="en-US"/>
           </a:p>
@@ -2169,7 +2169,7 @@
     </p:spTree>
     <p:extLst>
       <p:ext uri="{BB962C8B-B14F-4D97-AF65-F5344CB8AC3E}">
-        <p14:creationId xmlns="" xmlns:p14="http://schemas.microsoft.com/office/powerpoint/2010/main" val="3171841454"/>
+        <p14:creationId xmlns:p14="http://schemas.microsoft.com/office/powerpoint/2010/main" xmlns="" val="3171841454"/>
       </p:ext>
     </p:extLst>
   </p:cSld>
@@ -2376,7 +2376,7 @@
             <a:fld id="{846CE7D5-CF57-46EF-B807-FDD0502418D4}" type="datetimeFigureOut">
               <a:rPr lang="en-US" smtClean="0"/>
               <a:pPr/>
-              <a:t>4/26/2022</a:t>
+              <a:t>4/27/2022</a:t>
             </a:fld>
             <a:endParaRPr lang="en-US"/>
           </a:p>
@@ -2428,7 +2428,7 @@
     </p:spTree>
     <p:extLst>
       <p:ext uri="{BB962C8B-B14F-4D97-AF65-F5344CB8AC3E}">
-        <p14:creationId xmlns="" xmlns:p14="http://schemas.microsoft.com/office/powerpoint/2010/main" val="1718958274"/>
+        <p14:creationId xmlns:p14="http://schemas.microsoft.com/office/powerpoint/2010/main" xmlns="" val="1718958274"/>
       </p:ext>
     </p:extLst>
   </p:cSld>
@@ -2591,7 +2591,7 @@
             <a:fld id="{846CE7D5-CF57-46EF-B807-FDD0502418D4}" type="datetimeFigureOut">
               <a:rPr lang="en-US" smtClean="0"/>
               <a:pPr/>
-              <a:t>4/26/2022</a:t>
+              <a:t>4/27/2022</a:t>
             </a:fld>
             <a:endParaRPr lang="en-US"/>
           </a:p>
@@ -2679,7 +2679,7 @@
     </p:spTree>
     <p:extLst>
       <p:ext uri="{BB962C8B-B14F-4D97-AF65-F5344CB8AC3E}">
-        <p14:creationId xmlns="" xmlns:p14="http://schemas.microsoft.com/office/powerpoint/2010/main" val="2460954070"/>
+        <p14:creationId xmlns:p14="http://schemas.microsoft.com/office/powerpoint/2010/main" xmlns="" val="2460954070"/>
       </p:ext>
     </p:extLst>
   </p:cSld>
@@ -3002,7 +3002,7 @@
           <p:cNvPr id="11" name="Picture 11" descr="A picture containing text, electronics&#10;&#10;Description automatically generated">
             <a:extLst>
               <a:ext uri="{FF2B5EF4-FFF2-40B4-BE49-F238E27FC236}">
-                <a16:creationId xmlns="" xmlns:a16="http://schemas.microsoft.com/office/drawing/2014/main" id="{6CC3F4F3-EA3F-8D73-AD7E-9A061A2234A2}"/>
+                <a16:creationId xmlns:a16="http://schemas.microsoft.com/office/drawing/2014/main" xmlns="" id="{6CC3F4F3-EA3F-8D73-AD7E-9A061A2234A2}"/>
               </a:ext>
             </a:extLst>
           </p:cNvPr>
@@ -3032,7 +3032,7 @@
           <p:cNvPr id="14" name="Picture 14">
             <a:extLst>
               <a:ext uri="{FF2B5EF4-FFF2-40B4-BE49-F238E27FC236}">
-                <a16:creationId xmlns="" xmlns:a16="http://schemas.microsoft.com/office/drawing/2014/main" id="{DC652265-91D6-6368-3C05-AA6F9D77E20F}"/>
+                <a16:creationId xmlns:a16="http://schemas.microsoft.com/office/drawing/2014/main" xmlns="" id="{DC652265-91D6-6368-3C05-AA6F9D77E20F}"/>
               </a:ext>
             </a:extLst>
           </p:cNvPr>
@@ -3062,7 +3062,7 @@
           <p:cNvPr id="15" name="Picture 15" descr="A picture containing projector&#10;&#10;Description automatically generated">
             <a:extLst>
               <a:ext uri="{FF2B5EF4-FFF2-40B4-BE49-F238E27FC236}">
-                <a16:creationId xmlns="" xmlns:a16="http://schemas.microsoft.com/office/drawing/2014/main" id="{3225B246-1C1C-6AE8-541D-E93409B1D6A4}"/>
+                <a16:creationId xmlns:a16="http://schemas.microsoft.com/office/drawing/2014/main" xmlns="" id="{3225B246-1C1C-6AE8-541D-E93409B1D6A4}"/>
               </a:ext>
             </a:extLst>
           </p:cNvPr>
@@ -3092,7 +3092,7 @@
           <p:cNvPr id="16" name="Picture 16" descr="A picture containing text, indoor, appliance, door&#10;&#10;Description automatically generated">
             <a:extLst>
               <a:ext uri="{FF2B5EF4-FFF2-40B4-BE49-F238E27FC236}">
-                <a16:creationId xmlns="" xmlns:a16="http://schemas.microsoft.com/office/drawing/2014/main" id="{BF531008-5F65-3561-5329-E0A41EFE44DE}"/>
+                <a16:creationId xmlns:a16="http://schemas.microsoft.com/office/drawing/2014/main" xmlns="" id="{BF531008-5F65-3561-5329-E0A41EFE44DE}"/>
               </a:ext>
             </a:extLst>
           </p:cNvPr>
@@ -3122,7 +3122,7 @@
           <p:cNvPr id="19" name="Picture 14">
             <a:extLst>
               <a:ext uri="{FF2B5EF4-FFF2-40B4-BE49-F238E27FC236}">
-                <a16:creationId xmlns="" xmlns:a16="http://schemas.microsoft.com/office/drawing/2014/main" id="{2FCF6F72-4097-3AC5-AA33-0AF6EFE56404}"/>
+                <a16:creationId xmlns:a16="http://schemas.microsoft.com/office/drawing/2014/main" xmlns="" id="{2FCF6F72-4097-3AC5-AA33-0AF6EFE56404}"/>
               </a:ext>
             </a:extLst>
           </p:cNvPr>
@@ -3152,7 +3152,7 @@
           <p:cNvPr id="22" name="Picture 22" descr="A picture containing text, electronics, computer, dark&#10;&#10;Description automatically generated">
             <a:extLst>
               <a:ext uri="{FF2B5EF4-FFF2-40B4-BE49-F238E27FC236}">
-                <a16:creationId xmlns="" xmlns:a16="http://schemas.microsoft.com/office/drawing/2014/main" id="{EC7426C1-BB9C-8898-C677-DE1A38244C15}"/>
+                <a16:creationId xmlns:a16="http://schemas.microsoft.com/office/drawing/2014/main" xmlns="" id="{EC7426C1-BB9C-8898-C677-DE1A38244C15}"/>
               </a:ext>
             </a:extLst>
           </p:cNvPr>
@@ -3182,7 +3182,7 @@
           <p:cNvPr id="35" name="Picture 35" descr="A picture containing icon&#10;&#10;Description automatically generated">
             <a:extLst>
               <a:ext uri="{FF2B5EF4-FFF2-40B4-BE49-F238E27FC236}">
-                <a16:creationId xmlns="" xmlns:a16="http://schemas.microsoft.com/office/drawing/2014/main" id="{BEC32B48-E2B3-442C-25E8-A21CD52A829C}"/>
+                <a16:creationId xmlns:a16="http://schemas.microsoft.com/office/drawing/2014/main" xmlns="" id="{BEC32B48-E2B3-442C-25E8-A21CD52A829C}"/>
               </a:ext>
             </a:extLst>
           </p:cNvPr>
@@ -3212,7 +3212,7 @@
           <p:cNvPr id="36" name="Picture 36">
             <a:extLst>
               <a:ext uri="{FF2B5EF4-FFF2-40B4-BE49-F238E27FC236}">
-                <a16:creationId xmlns="" xmlns:a16="http://schemas.microsoft.com/office/drawing/2014/main" id="{A8B7F06D-EF77-6ED4-9177-FE270E434475}"/>
+                <a16:creationId xmlns:a16="http://schemas.microsoft.com/office/drawing/2014/main" xmlns="" id="{A8B7F06D-EF77-6ED4-9177-FE270E434475}"/>
               </a:ext>
             </a:extLst>
           </p:cNvPr>
@@ -3242,7 +3242,7 @@
           <p:cNvPr id="38" name="Picture 38" descr="Logo&#10;&#10;Description automatically generated">
             <a:extLst>
               <a:ext uri="{FF2B5EF4-FFF2-40B4-BE49-F238E27FC236}">
-                <a16:creationId xmlns="" xmlns:a16="http://schemas.microsoft.com/office/drawing/2014/main" id="{6F8F6181-78F2-AA15-912F-3785275E76F0}"/>
+                <a16:creationId xmlns:a16="http://schemas.microsoft.com/office/drawing/2014/main" xmlns="" id="{6F8F6181-78F2-AA15-912F-3785275E76F0}"/>
               </a:ext>
             </a:extLst>
           </p:cNvPr>
@@ -3259,7 +3259,7 @@
         </p:blipFill>
         <p:spPr>
           <a:xfrm>
-            <a:off x="5993223" y="2283658"/>
+            <a:off x="5653589" y="2283658"/>
             <a:ext cx="1669205" cy="1086559"/>
           </a:xfrm>
           <a:prstGeom prst="rect">
@@ -3282,7 +3282,7 @@
           <p:cNvPr id="39" name="Picture 39" descr="Icon&#10;&#10;Description automatically generated">
             <a:extLst>
               <a:ext uri="{FF2B5EF4-FFF2-40B4-BE49-F238E27FC236}">
-                <a16:creationId xmlns="" xmlns:a16="http://schemas.microsoft.com/office/drawing/2014/main" id="{FFF0FAF3-9F59-597D-46AF-00887947D73A}"/>
+                <a16:creationId xmlns:a16="http://schemas.microsoft.com/office/drawing/2014/main" xmlns="" id="{FFF0FAF3-9F59-597D-46AF-00887947D73A}"/>
               </a:ext>
             </a:extLst>
           </p:cNvPr>
@@ -3312,7 +3312,7 @@
           <p:cNvPr id="40" name="Picture 39" descr="Icon&#10;&#10;Description automatically generated">
             <a:extLst>
               <a:ext uri="{FF2B5EF4-FFF2-40B4-BE49-F238E27FC236}">
-                <a16:creationId xmlns="" xmlns:a16="http://schemas.microsoft.com/office/drawing/2014/main" id="{5F913B5A-8383-0A1A-D1D0-7D145907895C}"/>
+                <a16:creationId xmlns:a16="http://schemas.microsoft.com/office/drawing/2014/main" xmlns="" id="{5F913B5A-8383-0A1A-D1D0-7D145907895C}"/>
               </a:ext>
             </a:extLst>
           </p:cNvPr>
@@ -3342,7 +3342,7 @@
           <p:cNvPr id="42" name="Picture 42" descr="Logo&#10;&#10;Description automatically generated">
             <a:extLst>
               <a:ext uri="{FF2B5EF4-FFF2-40B4-BE49-F238E27FC236}">
-                <a16:creationId xmlns="" xmlns:a16="http://schemas.microsoft.com/office/drawing/2014/main" id="{8593B82C-ED50-A553-4B24-434F08E1DA58}"/>
+                <a16:creationId xmlns:a16="http://schemas.microsoft.com/office/drawing/2014/main" xmlns="" id="{8593B82C-ED50-A553-4B24-434F08E1DA58}"/>
               </a:ext>
             </a:extLst>
           </p:cNvPr>
@@ -3372,7 +3372,7 @@
           <p:cNvPr id="45" name="Picture 45" descr="Icon&#10;&#10;Description automatically generated">
             <a:extLst>
               <a:ext uri="{FF2B5EF4-FFF2-40B4-BE49-F238E27FC236}">
-                <a16:creationId xmlns="" xmlns:a16="http://schemas.microsoft.com/office/drawing/2014/main" id="{60333949-4508-97AB-0146-226F4B996872}"/>
+                <a16:creationId xmlns:a16="http://schemas.microsoft.com/office/drawing/2014/main" xmlns="" id="{60333949-4508-97AB-0146-226F4B996872}"/>
               </a:ext>
             </a:extLst>
           </p:cNvPr>
@@ -3603,7 +3603,7 @@
           <p:cNvPr id="71" name="Picture 14">
             <a:extLst>
               <a:ext uri="{FF2B5EF4-FFF2-40B4-BE49-F238E27FC236}">
-                <a16:creationId xmlns="" xmlns:a16="http://schemas.microsoft.com/office/drawing/2014/main" id="{2FCF6F72-4097-3AC5-AA33-0AF6EFE56404}"/>
+                <a16:creationId xmlns:a16="http://schemas.microsoft.com/office/drawing/2014/main" xmlns="" id="{2FCF6F72-4097-3AC5-AA33-0AF6EFE56404}"/>
               </a:ext>
             </a:extLst>
           </p:cNvPr>
@@ -3762,7 +3762,7 @@
           <p:cNvPr id="92" name="Picture 14">
             <a:extLst>
               <a:ext uri="{FF2B5EF4-FFF2-40B4-BE49-F238E27FC236}">
-                <a16:creationId xmlns="" xmlns:a16="http://schemas.microsoft.com/office/drawing/2014/main" id="{2FCF6F72-4097-3AC5-AA33-0AF6EFE56404}"/>
+                <a16:creationId xmlns:a16="http://schemas.microsoft.com/office/drawing/2014/main" xmlns="" id="{2FCF6F72-4097-3AC5-AA33-0AF6EFE56404}"/>
               </a:ext>
             </a:extLst>
           </p:cNvPr>
@@ -3822,15 +3822,7 @@
             </a:r>
             <a:r>
               <a:rPr lang="pt-BR" sz="1200" dirty="0" smtClean="0"/>
-              <a:t>- O servidor filtra os dados enviados pelo notebook, alimenta e salva os mesmos no Banco de Dados MySQL, que retorna </a:t>
-            </a:r>
-            <a:r>
-              <a:rPr lang="pt-BR" sz="1200" dirty="0" smtClean="0"/>
-              <a:t>novamente para </a:t>
-            </a:r>
-            <a:r>
-              <a:rPr lang="pt-BR" sz="1200" dirty="0" smtClean="0"/>
-              <a:t>a API (Também Node JS) que transfere as informações para o nossos Dashboards. </a:t>
+              <a:t>- O servidor filtra os dados enviados pelo notebook, alimenta e salva os mesmos no Banco de Dados MySQL, que retorna novamente para a API (Também Node JS) que transfere as informações para o nossos Dashboards. </a:t>
             </a:r>
             <a:endParaRPr lang="pt-BR" sz="1200" dirty="0"/>
           </a:p>
@@ -3945,7 +3937,7 @@
           <p:cNvPr id="122" name="Picture 14">
             <a:extLst>
               <a:ext uri="{FF2B5EF4-FFF2-40B4-BE49-F238E27FC236}">
-                <a16:creationId xmlns="" xmlns:a16="http://schemas.microsoft.com/office/drawing/2014/main" id="{2FCF6F72-4097-3AC5-AA33-0AF6EFE56404}"/>
+                <a16:creationId xmlns:a16="http://schemas.microsoft.com/office/drawing/2014/main" xmlns="" id="{2FCF6F72-4097-3AC5-AA33-0AF6EFE56404}"/>
               </a:ext>
             </a:extLst>
           </p:cNvPr>
@@ -4366,7 +4358,7 @@
           <p:cNvPr id="200" name="Picture 14">
             <a:extLst>
               <a:ext uri="{FF2B5EF4-FFF2-40B4-BE49-F238E27FC236}">
-                <a16:creationId xmlns="" xmlns:a16="http://schemas.microsoft.com/office/drawing/2014/main" id="{2FCF6F72-4097-3AC5-AA33-0AF6EFE56404}"/>
+                <a16:creationId xmlns:a16="http://schemas.microsoft.com/office/drawing/2014/main" xmlns="" id="{2FCF6F72-4097-3AC5-AA33-0AF6EFE56404}"/>
               </a:ext>
             </a:extLst>
           </p:cNvPr>
@@ -4462,7 +4454,7 @@
           <p:cNvPr id="203" name="Picture 14">
             <a:extLst>
               <a:ext uri="{FF2B5EF4-FFF2-40B4-BE49-F238E27FC236}">
-                <a16:creationId xmlns="" xmlns:a16="http://schemas.microsoft.com/office/drawing/2014/main" id="{2FCF6F72-4097-3AC5-AA33-0AF6EFE56404}"/>
+                <a16:creationId xmlns:a16="http://schemas.microsoft.com/office/drawing/2014/main" xmlns="" id="{2FCF6F72-4097-3AC5-AA33-0AF6EFE56404}"/>
               </a:ext>
             </a:extLst>
           </p:cNvPr>
@@ -4630,7 +4622,7 @@
           <p:cNvPr id="221" name="Picture 14">
             <a:extLst>
               <a:ext uri="{FF2B5EF4-FFF2-40B4-BE49-F238E27FC236}">
-                <a16:creationId xmlns="" xmlns:a16="http://schemas.microsoft.com/office/drawing/2014/main" id="{2FCF6F72-4097-3AC5-AA33-0AF6EFE56404}"/>
+                <a16:creationId xmlns:a16="http://schemas.microsoft.com/office/drawing/2014/main" xmlns="" id="{2FCF6F72-4097-3AC5-AA33-0AF6EFE56404}"/>
               </a:ext>
             </a:extLst>
           </p:cNvPr>
@@ -4786,7 +4778,7 @@
           <p:cNvPr id="225" name="Picture 14">
             <a:extLst>
               <a:ext uri="{FF2B5EF4-FFF2-40B4-BE49-F238E27FC236}">
-                <a16:creationId xmlns="" xmlns:a16="http://schemas.microsoft.com/office/drawing/2014/main" id="{2FCF6F72-4097-3AC5-AA33-0AF6EFE56404}"/>
+                <a16:creationId xmlns:a16="http://schemas.microsoft.com/office/drawing/2014/main" xmlns="" id="{2FCF6F72-4097-3AC5-AA33-0AF6EFE56404}"/>
               </a:ext>
             </a:extLst>
           </p:cNvPr>
@@ -4816,7 +4808,7 @@
           <p:cNvPr id="226" name="Picture 14">
             <a:extLst>
               <a:ext uri="{FF2B5EF4-FFF2-40B4-BE49-F238E27FC236}">
-                <a16:creationId xmlns="" xmlns:a16="http://schemas.microsoft.com/office/drawing/2014/main" id="{2FCF6F72-4097-3AC5-AA33-0AF6EFE56404}"/>
+                <a16:creationId xmlns:a16="http://schemas.microsoft.com/office/drawing/2014/main" xmlns="" id="{2FCF6F72-4097-3AC5-AA33-0AF6EFE56404}"/>
               </a:ext>
             </a:extLst>
           </p:cNvPr>
@@ -4849,8 +4841,8 @@
         </p:nvSpPr>
         <p:spPr>
           <a:xfrm>
-            <a:off x="9392195" y="3997235"/>
-            <a:ext cx="1097280" cy="369332"/>
+            <a:off x="9496698" y="3997235"/>
+            <a:ext cx="966651" cy="369332"/>
           </a:xfrm>
           <a:prstGeom prst="rect">
             <a:avLst/>
@@ -4925,10 +4917,34 @@
           </a:prstGeom>
         </p:spPr>
       </p:pic>
+      <p:pic>
+        <p:nvPicPr>
+          <p:cNvPr id="59" name="Imagem 58" descr="Rii.png"/>
+          <p:cNvPicPr>
+            <a:picLocks noChangeAspect="1"/>
+          </p:cNvPicPr>
+          <p:nvPr/>
+        </p:nvPicPr>
+        <p:blipFill>
+          <a:blip r:embed="rId25" cstate="print"/>
+          <a:stretch>
+            <a:fillRect/>
+          </a:stretch>
+        </p:blipFill>
+        <p:spPr>
+          <a:xfrm>
+            <a:off x="7237128" y="2662949"/>
+            <a:ext cx="496083" cy="496083"/>
+          </a:xfrm>
+          <a:prstGeom prst="rect">
+            <a:avLst/>
+          </a:prstGeom>
+        </p:spPr>
+      </p:pic>
     </p:spTree>
     <p:extLst>
       <p:ext uri="{BB962C8B-B14F-4D97-AF65-F5344CB8AC3E}">
-        <p14:creationId xmlns="" xmlns:p14="http://schemas.microsoft.com/office/powerpoint/2010/main" val="109857222"/>
+        <p14:creationId xmlns:p14="http://schemas.microsoft.com/office/powerpoint/2010/main" xmlns="" val="109857222"/>
       </p:ext>
     </p:extLst>
   </p:cSld>
@@ -5193,7 +5209,7 @@
   <a:extraClrSchemeLst/>
   <a:extLst>
     <a:ext uri="{05A4C25C-085E-4340-85A3-A5531E510DB2}">
-      <thm15:themeFamily xmlns="" xmlns:thm15="http://schemas.microsoft.com/office/thememl/2012/main" name="Office Theme" id="{62F939B6-93AF-4DB8-9C6B-D6C7DFDC589F}" vid="{4A3C46E8-61CC-4603-A589-7422A47A8E4A}"/>
+      <thm15:themeFamily xmlns:thm15="http://schemas.microsoft.com/office/thememl/2012/main" xmlns="" name="Office Theme" id="{62F939B6-93AF-4DB8-9C6B-D6C7DFDC589F}" vid="{4A3C46E8-61CC-4603-A589-7422A47A8E4A}"/>
     </a:ext>
   </a:extLst>
 </a:theme>

</xml_diff>